<commit_message>
Tilføjer videoklip og billede til slide
</commit_message>
<xml_diff>
--- a/Presentations/Presentation 1.pptx
+++ b/Presentations/Presentation 1.pptx
@@ -10,6 +10,7 @@
     <p:sldId id="258" r:id="rId4"/>
     <p:sldId id="259" r:id="rId5"/>
     <p:sldId id="260" r:id="rId6"/>
+    <p:sldId id="261" r:id="rId7"/>
   </p:sldIdLst>
   <p:sldSz cx="12192000" cy="6858000"/>
   <p:notesSz cx="6858000" cy="9144000"/>
@@ -108,6 +109,11 @@
       </a:defRPr>
     </a:lvl9pPr>
   </p:defaultTextStyle>
+  <p:extLst>
+    <p:ext uri="{EFAFB233-063F-42B5-8137-9DF3F51BA10A}">
+      <p15:sldGuideLst xmlns:p15="http://schemas.microsoft.com/office/powerpoint/2012/main"/>
+    </p:ext>
+  </p:extLst>
 </p:presentation>
 </file>
 
@@ -258,7 +264,7 @@
           <a:p>
             <a:fld id="{74917DF3-A4F5-47DB-8FD7-B1CBD877EFCA}" type="datetimeFigureOut">
               <a:rPr lang="da-DK" smtClean="0"/>
-              <a:t>02-10-2020</a:t>
+              <a:t>04-10-2020</a:t>
             </a:fld>
             <a:endParaRPr lang="da-DK"/>
           </a:p>
@@ -456,7 +462,7 @@
           <a:p>
             <a:fld id="{74917DF3-A4F5-47DB-8FD7-B1CBD877EFCA}" type="datetimeFigureOut">
               <a:rPr lang="da-DK" smtClean="0"/>
-              <a:t>02-10-2020</a:t>
+              <a:t>04-10-2020</a:t>
             </a:fld>
             <a:endParaRPr lang="da-DK"/>
           </a:p>
@@ -664,7 +670,7 @@
           <a:p>
             <a:fld id="{74917DF3-A4F5-47DB-8FD7-B1CBD877EFCA}" type="datetimeFigureOut">
               <a:rPr lang="da-DK" smtClean="0"/>
-              <a:t>02-10-2020</a:t>
+              <a:t>04-10-2020</a:t>
             </a:fld>
             <a:endParaRPr lang="da-DK"/>
           </a:p>
@@ -862,7 +868,7 @@
           <a:p>
             <a:fld id="{74917DF3-A4F5-47DB-8FD7-B1CBD877EFCA}" type="datetimeFigureOut">
               <a:rPr lang="da-DK" smtClean="0"/>
-              <a:t>02-10-2020</a:t>
+              <a:t>04-10-2020</a:t>
             </a:fld>
             <a:endParaRPr lang="da-DK"/>
           </a:p>
@@ -1137,7 +1143,7 @@
           <a:p>
             <a:fld id="{74917DF3-A4F5-47DB-8FD7-B1CBD877EFCA}" type="datetimeFigureOut">
               <a:rPr lang="da-DK" smtClean="0"/>
-              <a:t>02-10-2020</a:t>
+              <a:t>04-10-2020</a:t>
             </a:fld>
             <a:endParaRPr lang="da-DK"/>
           </a:p>
@@ -1402,7 +1408,7 @@
           <a:p>
             <a:fld id="{74917DF3-A4F5-47DB-8FD7-B1CBD877EFCA}" type="datetimeFigureOut">
               <a:rPr lang="da-DK" smtClean="0"/>
-              <a:t>02-10-2020</a:t>
+              <a:t>04-10-2020</a:t>
             </a:fld>
             <a:endParaRPr lang="da-DK"/>
           </a:p>
@@ -1814,7 +1820,7 @@
           <a:p>
             <a:fld id="{74917DF3-A4F5-47DB-8FD7-B1CBD877EFCA}" type="datetimeFigureOut">
               <a:rPr lang="da-DK" smtClean="0"/>
-              <a:t>02-10-2020</a:t>
+              <a:t>04-10-2020</a:t>
             </a:fld>
             <a:endParaRPr lang="da-DK"/>
           </a:p>
@@ -1955,7 +1961,7 @@
           <a:p>
             <a:fld id="{74917DF3-A4F5-47DB-8FD7-B1CBD877EFCA}" type="datetimeFigureOut">
               <a:rPr lang="da-DK" smtClean="0"/>
-              <a:t>02-10-2020</a:t>
+              <a:t>04-10-2020</a:t>
             </a:fld>
             <a:endParaRPr lang="da-DK"/>
           </a:p>
@@ -2068,7 +2074,7 @@
           <a:p>
             <a:fld id="{74917DF3-A4F5-47DB-8FD7-B1CBD877EFCA}" type="datetimeFigureOut">
               <a:rPr lang="da-DK" smtClean="0"/>
-              <a:t>02-10-2020</a:t>
+              <a:t>04-10-2020</a:t>
             </a:fld>
             <a:endParaRPr lang="da-DK"/>
           </a:p>
@@ -2379,7 +2385,7 @@
           <a:p>
             <a:fld id="{74917DF3-A4F5-47DB-8FD7-B1CBD877EFCA}" type="datetimeFigureOut">
               <a:rPr lang="da-DK" smtClean="0"/>
-              <a:t>02-10-2020</a:t>
+              <a:t>04-10-2020</a:t>
             </a:fld>
             <a:endParaRPr lang="da-DK"/>
           </a:p>
@@ -2667,7 +2673,7 @@
           <a:p>
             <a:fld id="{74917DF3-A4F5-47DB-8FD7-B1CBD877EFCA}" type="datetimeFigureOut">
               <a:rPr lang="da-DK" smtClean="0"/>
-              <a:t>02-10-2020</a:t>
+              <a:t>04-10-2020</a:t>
             </a:fld>
             <a:endParaRPr lang="da-DK"/>
           </a:p>
@@ -2908,7 +2914,7 @@
           <a:p>
             <a:fld id="{74917DF3-A4F5-47DB-8FD7-B1CBD877EFCA}" type="datetimeFigureOut">
               <a:rPr lang="da-DK" smtClean="0"/>
-              <a:t>02-10-2020</a:t>
+              <a:t>04-10-2020</a:t>
             </a:fld>
             <a:endParaRPr lang="da-DK"/>
           </a:p>
@@ -4517,6 +4523,83 @@
 </p:sld>
 </file>
 
+<file path=ppt/slides/slide6.xml><?xml version="1.0" encoding="utf-8"?>
+<p:sld xmlns:a="http://schemas.openxmlformats.org/drawingml/2006/main" xmlns:r="http://schemas.openxmlformats.org/officeDocument/2006/relationships" xmlns:p="http://schemas.openxmlformats.org/presentationml/2006/main">
+  <p:cSld>
+    <p:spTree>
+      <p:nvGrpSpPr>
+        <p:cNvPr id="1" name=""/>
+        <p:cNvGrpSpPr/>
+        <p:nvPr/>
+      </p:nvGrpSpPr>
+      <p:grpSpPr>
+        <a:xfrm>
+          <a:off x="0" y="0"/>
+          <a:ext cx="0" cy="0"/>
+          <a:chOff x="0" y="0"/>
+          <a:chExt cx="0" cy="0"/>
+        </a:xfrm>
+      </p:grpSpPr>
+      <p:pic>
+        <p:nvPicPr>
+          <p:cNvPr id="1026" name="Picture 2" descr="Ingen tilgængelig beskrivelse.">
+            <a:extLst>
+              <a:ext uri="{FF2B5EF4-FFF2-40B4-BE49-F238E27FC236}">
+                <a16:creationId xmlns:a16="http://schemas.microsoft.com/office/drawing/2014/main" id="{EC9F1341-B9F5-4969-BA0F-EAFE2CD06B99}"/>
+              </a:ext>
+            </a:extLst>
+          </p:cNvPr>
+          <p:cNvPicPr>
+            <a:picLocks noChangeAspect="1" noChangeArrowheads="1"/>
+          </p:cNvPicPr>
+          <p:nvPr/>
+        </p:nvPicPr>
+        <p:blipFill>
+          <a:blip r:embed="rId2">
+            <a:extLst>
+              <a:ext uri="{28A0092B-C50C-407E-A947-70E740481C1C}">
+                <a14:useLocalDpi xmlns:a14="http://schemas.microsoft.com/office/drawing/2010/main" val="0"/>
+              </a:ext>
+            </a:extLst>
+          </a:blip>
+          <a:srcRect/>
+          <a:stretch>
+            <a:fillRect/>
+          </a:stretch>
+        </p:blipFill>
+        <p:spPr bwMode="auto">
+          <a:xfrm rot="16200000">
+            <a:off x="3184787" y="-669569"/>
+            <a:ext cx="5991934" cy="8053875"/>
+          </a:xfrm>
+          <a:prstGeom prst="rect">
+            <a:avLst/>
+          </a:prstGeom>
+          <a:noFill/>
+          <a:extLst>
+            <a:ext uri="{909E8E84-426E-40DD-AFC4-6F175D3DCCD1}">
+              <a14:hiddenFill xmlns:a14="http://schemas.microsoft.com/office/drawing/2010/main">
+                <a:solidFill>
+                  <a:srgbClr val="FFFFFF"/>
+                </a:solidFill>
+              </a14:hiddenFill>
+            </a:ext>
+          </a:extLst>
+        </p:spPr>
+      </p:pic>
+    </p:spTree>
+    <p:extLst>
+      <p:ext uri="{BB962C8B-B14F-4D97-AF65-F5344CB8AC3E}">
+        <p14:creationId xmlns:p14="http://schemas.microsoft.com/office/powerpoint/2010/main" val="3068898006"/>
+      </p:ext>
+    </p:extLst>
+  </p:cSld>
+  <p:clrMapOvr>
+    <a:masterClrMapping/>
+  </p:clrMapOvr>
+</p:sld>
+</file>
+
 <file path=ppt/theme/theme1.xml><?xml version="1.0" encoding="utf-8"?>
 <a:theme xmlns:a="http://schemas.openxmlformats.org/drawingml/2006/main" name="Office-tema">
   <a:themeElements>

</xml_diff>

<commit_message>
Tilføjer samlet video og sidste del af silde
</commit_message>
<xml_diff>
--- a/Presentations/Presentation 1.pptx
+++ b/Presentations/Presentation 1.pptx
@@ -11,6 +11,7 @@
     <p:sldId id="259" r:id="rId5"/>
     <p:sldId id="260" r:id="rId6"/>
     <p:sldId id="261" r:id="rId7"/>
+    <p:sldId id="262" r:id="rId8"/>
   </p:sldIdLst>
   <p:sldSz cx="12192000" cy="6858000"/>
   <p:notesSz cx="6858000" cy="9144000"/>
@@ -264,7 +265,7 @@
           <a:p>
             <a:fld id="{74917DF3-A4F5-47DB-8FD7-B1CBD877EFCA}" type="datetimeFigureOut">
               <a:rPr lang="da-DK" smtClean="0"/>
-              <a:t>04-10-2020</a:t>
+              <a:t>07-10-2020</a:t>
             </a:fld>
             <a:endParaRPr lang="da-DK"/>
           </a:p>
@@ -462,7 +463,7 @@
           <a:p>
             <a:fld id="{74917DF3-A4F5-47DB-8FD7-B1CBD877EFCA}" type="datetimeFigureOut">
               <a:rPr lang="da-DK" smtClean="0"/>
-              <a:t>04-10-2020</a:t>
+              <a:t>07-10-2020</a:t>
             </a:fld>
             <a:endParaRPr lang="da-DK"/>
           </a:p>
@@ -670,7 +671,7 @@
           <a:p>
             <a:fld id="{74917DF3-A4F5-47DB-8FD7-B1CBD877EFCA}" type="datetimeFigureOut">
               <a:rPr lang="da-DK" smtClean="0"/>
-              <a:t>04-10-2020</a:t>
+              <a:t>07-10-2020</a:t>
             </a:fld>
             <a:endParaRPr lang="da-DK"/>
           </a:p>
@@ -868,7 +869,7 @@
           <a:p>
             <a:fld id="{74917DF3-A4F5-47DB-8FD7-B1CBD877EFCA}" type="datetimeFigureOut">
               <a:rPr lang="da-DK" smtClean="0"/>
-              <a:t>04-10-2020</a:t>
+              <a:t>07-10-2020</a:t>
             </a:fld>
             <a:endParaRPr lang="da-DK"/>
           </a:p>
@@ -1143,7 +1144,7 @@
           <a:p>
             <a:fld id="{74917DF3-A4F5-47DB-8FD7-B1CBD877EFCA}" type="datetimeFigureOut">
               <a:rPr lang="da-DK" smtClean="0"/>
-              <a:t>04-10-2020</a:t>
+              <a:t>07-10-2020</a:t>
             </a:fld>
             <a:endParaRPr lang="da-DK"/>
           </a:p>
@@ -1408,7 +1409,7 @@
           <a:p>
             <a:fld id="{74917DF3-A4F5-47DB-8FD7-B1CBD877EFCA}" type="datetimeFigureOut">
               <a:rPr lang="da-DK" smtClean="0"/>
-              <a:t>04-10-2020</a:t>
+              <a:t>07-10-2020</a:t>
             </a:fld>
             <a:endParaRPr lang="da-DK"/>
           </a:p>
@@ -1820,7 +1821,7 @@
           <a:p>
             <a:fld id="{74917DF3-A4F5-47DB-8FD7-B1CBD877EFCA}" type="datetimeFigureOut">
               <a:rPr lang="da-DK" smtClean="0"/>
-              <a:t>04-10-2020</a:t>
+              <a:t>07-10-2020</a:t>
             </a:fld>
             <a:endParaRPr lang="da-DK"/>
           </a:p>
@@ -1961,7 +1962,7 @@
           <a:p>
             <a:fld id="{74917DF3-A4F5-47DB-8FD7-B1CBD877EFCA}" type="datetimeFigureOut">
               <a:rPr lang="da-DK" smtClean="0"/>
-              <a:t>04-10-2020</a:t>
+              <a:t>07-10-2020</a:t>
             </a:fld>
             <a:endParaRPr lang="da-DK"/>
           </a:p>
@@ -2074,7 +2075,7 @@
           <a:p>
             <a:fld id="{74917DF3-A4F5-47DB-8FD7-B1CBD877EFCA}" type="datetimeFigureOut">
               <a:rPr lang="da-DK" smtClean="0"/>
-              <a:t>04-10-2020</a:t>
+              <a:t>07-10-2020</a:t>
             </a:fld>
             <a:endParaRPr lang="da-DK"/>
           </a:p>
@@ -2385,7 +2386,7 @@
           <a:p>
             <a:fld id="{74917DF3-A4F5-47DB-8FD7-B1CBD877EFCA}" type="datetimeFigureOut">
               <a:rPr lang="da-DK" smtClean="0"/>
-              <a:t>04-10-2020</a:t>
+              <a:t>07-10-2020</a:t>
             </a:fld>
             <a:endParaRPr lang="da-DK"/>
           </a:p>
@@ -2673,7 +2674,7 @@
           <a:p>
             <a:fld id="{74917DF3-A4F5-47DB-8FD7-B1CBD877EFCA}" type="datetimeFigureOut">
               <a:rPr lang="da-DK" smtClean="0"/>
-              <a:t>04-10-2020</a:t>
+              <a:t>07-10-2020</a:t>
             </a:fld>
             <a:endParaRPr lang="da-DK"/>
           </a:p>
@@ -2914,7 +2915,7 @@
           <a:p>
             <a:fld id="{74917DF3-A4F5-47DB-8FD7-B1CBD877EFCA}" type="datetimeFigureOut">
               <a:rPr lang="da-DK" smtClean="0"/>
-              <a:t>04-10-2020</a:t>
+              <a:t>07-10-2020</a:t>
             </a:fld>
             <a:endParaRPr lang="da-DK"/>
           </a:p>
@@ -4600,6 +4601,72 @@
 </p:sld>
 </file>
 
+<file path=ppt/slides/slide7.xml><?xml version="1.0" encoding="utf-8"?>
+<p:sld xmlns:a="http://schemas.openxmlformats.org/drawingml/2006/main" xmlns:r="http://schemas.openxmlformats.org/officeDocument/2006/relationships" xmlns:p="http://schemas.openxmlformats.org/presentationml/2006/main">
+  <p:cSld>
+    <p:spTree>
+      <p:nvGrpSpPr>
+        <p:cNvPr id="1" name=""/>
+        <p:cNvGrpSpPr/>
+        <p:nvPr/>
+      </p:nvGrpSpPr>
+      <p:grpSpPr>
+        <a:xfrm>
+          <a:off x="0" y="0"/>
+          <a:ext cx="0" cy="0"/>
+          <a:chOff x="0" y="0"/>
+          <a:chExt cx="0" cy="0"/>
+        </a:xfrm>
+      </p:grpSpPr>
+      <p:pic>
+        <p:nvPicPr>
+          <p:cNvPr id="5" name="Billede 4">
+            <a:extLst>
+              <a:ext uri="{FF2B5EF4-FFF2-40B4-BE49-F238E27FC236}">
+                <a16:creationId xmlns:a16="http://schemas.microsoft.com/office/drawing/2014/main" id="{CA16E433-D835-4F0F-886E-90E685BA17CA}"/>
+              </a:ext>
+            </a:extLst>
+          </p:cNvPr>
+          <p:cNvPicPr>
+            <a:picLocks noChangeAspect="1"/>
+          </p:cNvPicPr>
+          <p:nvPr/>
+        </p:nvPicPr>
+        <p:blipFill>
+          <a:blip r:embed="rId2">
+            <a:extLst>
+              <a:ext uri="{28A0092B-C50C-407E-A947-70E740481C1C}">
+                <a14:useLocalDpi xmlns:a14="http://schemas.microsoft.com/office/drawing/2010/main" val="0"/>
+              </a:ext>
+            </a:extLst>
+          </a:blip>
+          <a:stretch>
+            <a:fillRect/>
+          </a:stretch>
+        </p:blipFill>
+        <p:spPr>
+          <a:xfrm>
+            <a:off x="865690" y="0"/>
+            <a:ext cx="10460620" cy="6858000"/>
+          </a:xfrm>
+          <a:prstGeom prst="rect">
+            <a:avLst/>
+          </a:prstGeom>
+        </p:spPr>
+      </p:pic>
+    </p:spTree>
+    <p:extLst>
+      <p:ext uri="{BB962C8B-B14F-4D97-AF65-F5344CB8AC3E}">
+        <p14:creationId xmlns:p14="http://schemas.microsoft.com/office/powerpoint/2010/main" val="328534333"/>
+      </p:ext>
+    </p:extLst>
+  </p:cSld>
+  <p:clrMapOvr>
+    <a:masterClrMapping/>
+  </p:clrMapOvr>
+</p:sld>
+</file>
+
 <file path=ppt/theme/theme1.xml><?xml version="1.0" encoding="utf-8"?>
 <a:theme xmlns:a="http://schemas.openxmlformats.org/drawingml/2006/main" name="Office-tema">
   <a:themeElements>

</xml_diff>